<commit_message>
updated burndown chart, updated skeleton presentation
</commit_message>
<xml_diff>
--- a/Sprint Documentation/Caliber Mobile Presentation.pptx
+++ b/Sprint Documentation/Caliber Mobile Presentation.pptx
@@ -5,11 +5,20 @@
     <p:sldMasterId id="2147483661" r:id="rId1"/>
   </p:sldMasterIdLst>
   <p:notesMasterIdLst>
-    <p:notesMasterId r:id="rId4"/>
+    <p:notesMasterId r:id="rId13"/>
   </p:notesMasterIdLst>
   <p:sldIdLst>
     <p:sldId id="256" r:id="rId2"/>
     <p:sldId id="257" r:id="rId3"/>
+    <p:sldId id="258" r:id="rId4"/>
+    <p:sldId id="259" r:id="rId5"/>
+    <p:sldId id="260" r:id="rId6"/>
+    <p:sldId id="261" r:id="rId7"/>
+    <p:sldId id="262" r:id="rId8"/>
+    <p:sldId id="263" r:id="rId9"/>
+    <p:sldId id="264" r:id="rId10"/>
+    <p:sldId id="265" r:id="rId11"/>
+    <p:sldId id="266" r:id="rId12"/>
   </p:sldIdLst>
   <p:sldSz cx="9144000" cy="6858000" type="screen4x3"/>
   <p:notesSz cx="7010400" cy="9296400"/>
@@ -242,6 +251,30 @@
       </a:defRPr>
     </a:lvl9pPr>
   </p:defaultTextStyle>
+  <p:extLst>
+    <p:ext uri="{521415D9-36F7-43E2-AB2F-B90AF26B5E84}">
+      <p14:sectionLst xmlns:p14="http://schemas.microsoft.com/office/powerpoint/2010/main">
+        <p14:section name="Default Section" id="{D2174568-588D-443F-9CCA-34CA3D123DF4}">
+          <p14:sldIdLst>
+            <p14:sldId id="256"/>
+            <p14:sldId id="257"/>
+            <p14:sldId id="258"/>
+            <p14:sldId id="259"/>
+            <p14:sldId id="260"/>
+            <p14:sldId id="261"/>
+            <p14:sldId id="262"/>
+            <p14:sldId id="263"/>
+            <p14:sldId id="264"/>
+            <p14:sldId id="265"/>
+            <p14:sldId id="266"/>
+          </p14:sldIdLst>
+        </p14:section>
+      </p14:sectionLst>
+    </p:ext>
+    <p:ext uri="{EFAFB233-063F-42B5-8137-9DF3F51BA10A}">
+      <p15:sldGuideLst xmlns:p15="http://schemas.microsoft.com/office/powerpoint/2012/main"/>
+    </p:ext>
+  </p:extLst>
 </p:presentation>
 </file>
 
@@ -27812,6 +27845,242 @@
 </p:sld>
 </file>
 
+<file path=ppt/slides/slide10.xml><?xml version="1.0" encoding="utf-8"?>
+<p:sld xmlns:a="http://schemas.openxmlformats.org/drawingml/2006/main" xmlns:r="http://schemas.openxmlformats.org/officeDocument/2006/relationships" xmlns:p="http://schemas.openxmlformats.org/presentationml/2006/main">
+  <p:cSld>
+    <p:spTree>
+      <p:nvGrpSpPr>
+        <p:cNvPr id="1" name=""/>
+        <p:cNvGrpSpPr/>
+        <p:nvPr/>
+      </p:nvGrpSpPr>
+      <p:grpSpPr>
+        <a:xfrm>
+          <a:off x="0" y="0"/>
+          <a:ext cx="0" cy="0"/>
+          <a:chOff x="0" y="0"/>
+          <a:chExt cx="0" cy="0"/>
+        </a:xfrm>
+      </p:grpSpPr>
+      <p:sp>
+        <p:nvSpPr>
+          <p:cNvPr id="2" name="Title 1">
+            <a:extLst>
+              <a:ext uri="{FF2B5EF4-FFF2-40B4-BE49-F238E27FC236}">
+                <a16:creationId xmlns:a16="http://schemas.microsoft.com/office/drawing/2014/main" id="{6A0DAE64-EEF4-40D5-8A6F-9DAA9370B45A}"/>
+              </a:ext>
+            </a:extLst>
+          </p:cNvPr>
+          <p:cNvSpPr>
+            <a:spLocks noGrp="1"/>
+          </p:cNvSpPr>
+          <p:nvPr>
+            <p:ph type="title"/>
+          </p:nvPr>
+        </p:nvSpPr>
+        <p:spPr/>
+        <p:txBody>
+          <a:bodyPr/>
+          <a:lstStyle/>
+          <a:p>
+            <a:endParaRPr lang="en-US"/>
+          </a:p>
+        </p:txBody>
+      </p:sp>
+      <p:sp>
+        <p:nvSpPr>
+          <p:cNvPr id="3" name="Text Placeholder 2">
+            <a:extLst>
+              <a:ext uri="{FF2B5EF4-FFF2-40B4-BE49-F238E27FC236}">
+                <a16:creationId xmlns:a16="http://schemas.microsoft.com/office/drawing/2014/main" id="{954976C6-BC48-4960-8B63-50BA8A598307}"/>
+              </a:ext>
+            </a:extLst>
+          </p:cNvPr>
+          <p:cNvSpPr>
+            <a:spLocks noGrp="1"/>
+          </p:cNvSpPr>
+          <p:nvPr>
+            <p:ph type="body" idx="1"/>
+          </p:nvPr>
+        </p:nvSpPr>
+        <p:spPr/>
+        <p:txBody>
+          <a:bodyPr/>
+          <a:lstStyle/>
+          <a:p>
+            <a:endParaRPr lang="en-US"/>
+          </a:p>
+        </p:txBody>
+      </p:sp>
+      <p:sp>
+        <p:nvSpPr>
+          <p:cNvPr id="4" name="Slide Number Placeholder 3">
+            <a:extLst>
+              <a:ext uri="{FF2B5EF4-FFF2-40B4-BE49-F238E27FC236}">
+                <a16:creationId xmlns:a16="http://schemas.microsoft.com/office/drawing/2014/main" id="{9B6B6D48-4E9E-4F26-B70B-FCAEB0E0F061}"/>
+              </a:ext>
+            </a:extLst>
+          </p:cNvPr>
+          <p:cNvSpPr>
+            <a:spLocks noGrp="1"/>
+          </p:cNvSpPr>
+          <p:nvPr>
+            <p:ph type="sldNum" idx="12"/>
+          </p:nvPr>
+        </p:nvSpPr>
+        <p:spPr/>
+        <p:txBody>
+          <a:bodyPr/>
+          <a:lstStyle/>
+          <a:p>
+            <a:pPr marL="0" lvl="0" indent="0" algn="r" rtl="0">
+              <a:spcBef>
+                <a:spcPts val="0"/>
+              </a:spcBef>
+              <a:spcAft>
+                <a:spcPts val="0"/>
+              </a:spcAft>
+              <a:buNone/>
+            </a:pPr>
+            <a:fld id="{00000000-1234-1234-1234-123412341234}" type="slidenum">
+              <a:rPr lang="en-US" smtClean="0"/>
+              <a:t>9</a:t>
+            </a:fld>
+            <a:endParaRPr lang="en-US"/>
+          </a:p>
+        </p:txBody>
+      </p:sp>
+    </p:spTree>
+    <p:extLst>
+      <p:ext uri="{BB962C8B-B14F-4D97-AF65-F5344CB8AC3E}">
+        <p14:creationId xmlns:p14="http://schemas.microsoft.com/office/powerpoint/2010/main" val="3876408982"/>
+      </p:ext>
+    </p:extLst>
+  </p:cSld>
+  <p:clrMapOvr>
+    <a:masterClrMapping/>
+  </p:clrMapOvr>
+</p:sld>
+</file>
+
+<file path=ppt/slides/slide11.xml><?xml version="1.0" encoding="utf-8"?>
+<p:sld xmlns:a="http://schemas.openxmlformats.org/drawingml/2006/main" xmlns:r="http://schemas.openxmlformats.org/officeDocument/2006/relationships" xmlns:p="http://schemas.openxmlformats.org/presentationml/2006/main">
+  <p:cSld>
+    <p:spTree>
+      <p:nvGrpSpPr>
+        <p:cNvPr id="1" name=""/>
+        <p:cNvGrpSpPr/>
+        <p:nvPr/>
+      </p:nvGrpSpPr>
+      <p:grpSpPr>
+        <a:xfrm>
+          <a:off x="0" y="0"/>
+          <a:ext cx="0" cy="0"/>
+          <a:chOff x="0" y="0"/>
+          <a:chExt cx="0" cy="0"/>
+        </a:xfrm>
+      </p:grpSpPr>
+      <p:sp>
+        <p:nvSpPr>
+          <p:cNvPr id="2" name="Title 1">
+            <a:extLst>
+              <a:ext uri="{FF2B5EF4-FFF2-40B4-BE49-F238E27FC236}">
+                <a16:creationId xmlns:a16="http://schemas.microsoft.com/office/drawing/2014/main" id="{85E8C1D9-3597-4199-ADA2-56CCDA12B66D}"/>
+              </a:ext>
+            </a:extLst>
+          </p:cNvPr>
+          <p:cNvSpPr>
+            <a:spLocks noGrp="1"/>
+          </p:cNvSpPr>
+          <p:nvPr>
+            <p:ph type="title"/>
+          </p:nvPr>
+        </p:nvSpPr>
+        <p:spPr/>
+        <p:txBody>
+          <a:bodyPr/>
+          <a:lstStyle/>
+          <a:p>
+            <a:endParaRPr lang="en-US"/>
+          </a:p>
+        </p:txBody>
+      </p:sp>
+      <p:sp>
+        <p:nvSpPr>
+          <p:cNvPr id="3" name="Text Placeholder 2">
+            <a:extLst>
+              <a:ext uri="{FF2B5EF4-FFF2-40B4-BE49-F238E27FC236}">
+                <a16:creationId xmlns:a16="http://schemas.microsoft.com/office/drawing/2014/main" id="{E52B90B4-3541-4E1B-8D27-5EAE719C4AC4}"/>
+              </a:ext>
+            </a:extLst>
+          </p:cNvPr>
+          <p:cNvSpPr>
+            <a:spLocks noGrp="1"/>
+          </p:cNvSpPr>
+          <p:nvPr>
+            <p:ph type="body" idx="1"/>
+          </p:nvPr>
+        </p:nvSpPr>
+        <p:spPr/>
+        <p:txBody>
+          <a:bodyPr/>
+          <a:lstStyle/>
+          <a:p>
+            <a:endParaRPr lang="en-US"/>
+          </a:p>
+        </p:txBody>
+      </p:sp>
+      <p:sp>
+        <p:nvSpPr>
+          <p:cNvPr id="4" name="Slide Number Placeholder 3">
+            <a:extLst>
+              <a:ext uri="{FF2B5EF4-FFF2-40B4-BE49-F238E27FC236}">
+                <a16:creationId xmlns:a16="http://schemas.microsoft.com/office/drawing/2014/main" id="{F5A86FA3-EA1A-4B63-87B1-1AA9225974BB}"/>
+              </a:ext>
+            </a:extLst>
+          </p:cNvPr>
+          <p:cNvSpPr>
+            <a:spLocks noGrp="1"/>
+          </p:cNvSpPr>
+          <p:nvPr>
+            <p:ph type="sldNum" idx="12"/>
+          </p:nvPr>
+        </p:nvSpPr>
+        <p:spPr/>
+        <p:txBody>
+          <a:bodyPr/>
+          <a:lstStyle/>
+          <a:p>
+            <a:pPr marL="0" lvl="0" indent="0" algn="r" rtl="0">
+              <a:spcBef>
+                <a:spcPts val="0"/>
+              </a:spcBef>
+              <a:spcAft>
+                <a:spcPts val="0"/>
+              </a:spcAft>
+              <a:buNone/>
+            </a:pPr>
+            <a:fld id="{00000000-1234-1234-1234-123412341234}" type="slidenum">
+              <a:rPr lang="en-US" smtClean="0"/>
+              <a:t>10</a:t>
+            </a:fld>
+            <a:endParaRPr lang="en-US"/>
+          </a:p>
+        </p:txBody>
+      </p:sp>
+    </p:spTree>
+    <p:extLst>
+      <p:ext uri="{BB962C8B-B14F-4D97-AF65-F5344CB8AC3E}">
+        <p14:creationId xmlns:p14="http://schemas.microsoft.com/office/powerpoint/2010/main" val="3490170656"/>
+      </p:ext>
+    </p:extLst>
+  </p:cSld>
+  <p:clrMapOvr>
+    <a:masterClrMapping/>
+  </p:clrMapOvr>
+</p:sld>
+</file>
+
 <file path=ppt/slides/slide2.xml><?xml version="1.0" encoding="utf-8"?>
 <p:sld xmlns:a="http://schemas.openxmlformats.org/drawingml/2006/main" xmlns:r="http://schemas.openxmlformats.org/officeDocument/2006/relationships" xmlns:p="http://schemas.openxmlformats.org/presentationml/2006/main">
   <p:cSld>
@@ -27872,7 +28141,7 @@
               <a:buNone/>
             </a:pPr>
             <a:r>
-              <a:rPr lang="en-US" sz="2400" b="1" i="0" u="none" strike="noStrike" cap="none" dirty="0">
+              <a:rPr lang="en-US" sz="2800" b="1" i="0" u="none" strike="noStrike" cap="none" dirty="0">
                 <a:solidFill>
                   <a:schemeClr val="lt1"/>
                 </a:solidFill>
@@ -27883,7 +28152,7 @@
               </a:rPr>
               <a:t>Table of Contents</a:t>
             </a:r>
-            <a:endParaRPr sz="2400" b="1" i="0" u="none" strike="noStrike" cap="none" dirty="0">
+            <a:endParaRPr sz="2800" b="1" i="0" u="none" strike="noStrike" cap="none" dirty="0">
               <a:solidFill>
                 <a:schemeClr val="lt1"/>
               </a:solidFill>
@@ -27938,7 +28207,232 @@
               <a:buFont typeface="+mj-lt"/>
               <a:buAutoNum type="arabicPeriod"/>
             </a:pPr>
-            <a:endParaRPr sz="2800" b="0" i="0" u="none" strike="noStrike" cap="none">
+            <a:r>
+              <a:rPr lang="en-US" sz="2800" b="0" i="0" u="none" strike="noStrike" cap="none" dirty="0">
+                <a:solidFill>
+                  <a:schemeClr val="dk2"/>
+                </a:solidFill>
+                <a:latin typeface="Arial"/>
+                <a:ea typeface="Arial"/>
+                <a:cs typeface="Arial"/>
+                <a:sym typeface="Arial"/>
+              </a:rPr>
+              <a:t>Caliber Mobile- Synopsis</a:t>
+            </a:r>
+          </a:p>
+          <a:p>
+            <a:pPr marL="692150" marR="0" lvl="0" indent="-514350" algn="l" rtl="0">
+              <a:spcBef>
+                <a:spcPts val="0"/>
+              </a:spcBef>
+              <a:spcAft>
+                <a:spcPts val="0"/>
+              </a:spcAft>
+              <a:buClr>
+                <a:schemeClr val="accent1"/>
+              </a:buClr>
+              <a:buSzPts val="2800"/>
+              <a:buFont typeface="+mj-lt"/>
+              <a:buAutoNum type="arabicPeriod"/>
+            </a:pPr>
+            <a:r>
+              <a:rPr lang="en-US" dirty="0"/>
+              <a:t>The Team</a:t>
+            </a:r>
+          </a:p>
+          <a:p>
+            <a:pPr marL="692150" marR="0" lvl="0" indent="-514350" algn="l" rtl="0">
+              <a:spcBef>
+                <a:spcPts val="0"/>
+              </a:spcBef>
+              <a:spcAft>
+                <a:spcPts val="0"/>
+              </a:spcAft>
+              <a:buClr>
+                <a:schemeClr val="accent1"/>
+              </a:buClr>
+              <a:buSzPts val="2800"/>
+              <a:buFont typeface="+mj-lt"/>
+              <a:buAutoNum type="arabicPeriod"/>
+            </a:pPr>
+            <a:r>
+              <a:rPr lang="en-US" sz="2800" b="0" i="0" u="none" strike="noStrike" cap="none" dirty="0">
+                <a:solidFill>
+                  <a:schemeClr val="dk2"/>
+                </a:solidFill>
+                <a:latin typeface="Arial"/>
+                <a:ea typeface="Arial"/>
+                <a:cs typeface="Arial"/>
+                <a:sym typeface="Arial"/>
+              </a:rPr>
+              <a:t>Technologies Used</a:t>
+            </a:r>
+          </a:p>
+          <a:p>
+            <a:pPr marL="692150" marR="0" lvl="0" indent="-514350" algn="l" rtl="0">
+              <a:spcBef>
+                <a:spcPts val="0"/>
+              </a:spcBef>
+              <a:spcAft>
+                <a:spcPts val="0"/>
+              </a:spcAft>
+              <a:buClr>
+                <a:schemeClr val="accent1"/>
+              </a:buClr>
+              <a:buSzPts val="2800"/>
+              <a:buFont typeface="+mj-lt"/>
+              <a:buAutoNum type="arabicPeriod"/>
+            </a:pPr>
+            <a:r>
+              <a:rPr lang="en-US" dirty="0"/>
+              <a:t>Showcase- Demo</a:t>
+            </a:r>
+            <a:endParaRPr lang="en-US" sz="2800" b="0" i="0" u="none" strike="noStrike" cap="none" dirty="0">
+              <a:solidFill>
+                <a:schemeClr val="dk2"/>
+              </a:solidFill>
+              <a:latin typeface="Arial"/>
+              <a:ea typeface="Arial"/>
+              <a:cs typeface="Arial"/>
+              <a:sym typeface="Arial"/>
+            </a:endParaRPr>
+          </a:p>
+          <a:p>
+            <a:pPr marL="692150" marR="0" lvl="0" indent="-514350" algn="l" rtl="0">
+              <a:spcBef>
+                <a:spcPts val="0"/>
+              </a:spcBef>
+              <a:spcAft>
+                <a:spcPts val="0"/>
+              </a:spcAft>
+              <a:buClr>
+                <a:schemeClr val="accent1"/>
+              </a:buClr>
+              <a:buSzPts val="2800"/>
+              <a:buFont typeface="+mj-lt"/>
+              <a:buAutoNum type="arabicPeriod"/>
+            </a:pPr>
+            <a:r>
+              <a:rPr lang="en-US" dirty="0"/>
+              <a:t>The Development Journey- User Stories</a:t>
+            </a:r>
+          </a:p>
+          <a:p>
+            <a:pPr marL="692150" marR="0" lvl="0" indent="-514350" algn="l" rtl="0">
+              <a:spcBef>
+                <a:spcPts val="0"/>
+              </a:spcBef>
+              <a:spcAft>
+                <a:spcPts val="0"/>
+              </a:spcAft>
+              <a:buClr>
+                <a:schemeClr val="accent1"/>
+              </a:buClr>
+              <a:buSzPts val="2800"/>
+              <a:buFont typeface="+mj-lt"/>
+              <a:buAutoNum type="arabicPeriod"/>
+            </a:pPr>
+            <a:r>
+              <a:rPr lang="en-US" dirty="0"/>
+              <a:t>The Development Journey- Testing</a:t>
+            </a:r>
+          </a:p>
+          <a:p>
+            <a:pPr marL="692150" marR="0" lvl="0" indent="-514350" algn="l" rtl="0">
+              <a:spcBef>
+                <a:spcPts val="0"/>
+              </a:spcBef>
+              <a:spcAft>
+                <a:spcPts val="0"/>
+              </a:spcAft>
+              <a:buClr>
+                <a:schemeClr val="accent1"/>
+              </a:buClr>
+              <a:buSzPts val="2800"/>
+              <a:buFont typeface="+mj-lt"/>
+              <a:buAutoNum type="arabicPeriod"/>
+            </a:pPr>
+            <a:r>
+              <a:rPr lang="en-US" sz="2800" b="0" i="0" u="none" strike="noStrike" cap="none" dirty="0">
+                <a:solidFill>
+                  <a:schemeClr val="dk2"/>
+                </a:solidFill>
+                <a:latin typeface="Arial"/>
+                <a:ea typeface="Arial"/>
+                <a:cs typeface="Arial"/>
+                <a:sym typeface="Arial"/>
+              </a:rPr>
+              <a:t>The Devel</a:t>
+            </a:r>
+            <a:r>
+              <a:rPr lang="en-US" dirty="0"/>
+              <a:t>opment Journey- Burndown Chart</a:t>
+            </a:r>
+          </a:p>
+          <a:p>
+            <a:pPr marL="692150" marR="0" lvl="0" indent="-514350" algn="l" rtl="0">
+              <a:spcBef>
+                <a:spcPts val="0"/>
+              </a:spcBef>
+              <a:spcAft>
+                <a:spcPts val="0"/>
+              </a:spcAft>
+              <a:buClr>
+                <a:schemeClr val="accent1"/>
+              </a:buClr>
+              <a:buSzPts val="2800"/>
+              <a:buFont typeface="+mj-lt"/>
+              <a:buAutoNum type="arabicPeriod"/>
+            </a:pPr>
+            <a:r>
+              <a:rPr lang="en-US" dirty="0"/>
+              <a:t>Stretch Goals</a:t>
+            </a:r>
+          </a:p>
+          <a:p>
+            <a:pPr marL="692150" marR="0" lvl="0" indent="-514350" algn="l" rtl="0">
+              <a:spcBef>
+                <a:spcPts val="0"/>
+              </a:spcBef>
+              <a:spcAft>
+                <a:spcPts val="0"/>
+              </a:spcAft>
+              <a:buClr>
+                <a:schemeClr val="accent1"/>
+              </a:buClr>
+              <a:buSzPts val="2800"/>
+              <a:buFont typeface="+mj-lt"/>
+              <a:buAutoNum type="arabicPeriod"/>
+            </a:pPr>
+            <a:r>
+              <a:rPr lang="en-US" sz="2800" b="0" i="0" u="none" strike="noStrike" cap="none" dirty="0">
+                <a:solidFill>
+                  <a:schemeClr val="dk2"/>
+                </a:solidFill>
+                <a:latin typeface="Arial"/>
+                <a:ea typeface="Arial"/>
+                <a:cs typeface="Arial"/>
+                <a:sym typeface="Arial"/>
+              </a:rPr>
+              <a:t>Challenges</a:t>
+            </a:r>
+          </a:p>
+          <a:p>
+            <a:pPr marL="692150" marR="0" lvl="0" indent="-514350" algn="l" rtl="0">
+              <a:spcBef>
+                <a:spcPts val="0"/>
+              </a:spcBef>
+              <a:spcAft>
+                <a:spcPts val="0"/>
+              </a:spcAft>
+              <a:buClr>
+                <a:schemeClr val="accent1"/>
+              </a:buClr>
+              <a:buSzPts val="2800"/>
+              <a:buFont typeface="+mj-lt"/>
+              <a:buAutoNum type="arabicPeriod"/>
+            </a:pPr>
+            <a:endParaRPr sz="2800" b="0" i="0" u="none" strike="noStrike" cap="none" dirty="0">
               <a:solidFill>
                 <a:schemeClr val="dk2"/>
               </a:solidFill>
@@ -28013,6 +28507,961 @@
         </p:txBody>
       </p:sp>
     </p:spTree>
+  </p:cSld>
+  <p:clrMapOvr>
+    <a:masterClrMapping/>
+  </p:clrMapOvr>
+</p:sld>
+</file>
+
+<file path=ppt/slides/slide3.xml><?xml version="1.0" encoding="utf-8"?>
+<p:sld xmlns:a="http://schemas.openxmlformats.org/drawingml/2006/main" xmlns:r="http://schemas.openxmlformats.org/officeDocument/2006/relationships" xmlns:p="http://schemas.openxmlformats.org/presentationml/2006/main">
+  <p:cSld>
+    <p:spTree>
+      <p:nvGrpSpPr>
+        <p:cNvPr id="1" name=""/>
+        <p:cNvGrpSpPr/>
+        <p:nvPr/>
+      </p:nvGrpSpPr>
+      <p:grpSpPr>
+        <a:xfrm>
+          <a:off x="0" y="0"/>
+          <a:ext cx="0" cy="0"/>
+          <a:chOff x="0" y="0"/>
+          <a:chExt cx="0" cy="0"/>
+        </a:xfrm>
+      </p:grpSpPr>
+      <p:sp>
+        <p:nvSpPr>
+          <p:cNvPr id="2" name="Title 1">
+            <a:extLst>
+              <a:ext uri="{FF2B5EF4-FFF2-40B4-BE49-F238E27FC236}">
+                <a16:creationId xmlns:a16="http://schemas.microsoft.com/office/drawing/2014/main" id="{86E4A14D-0EB9-411A-AA44-18072F08B5C4}"/>
+              </a:ext>
+            </a:extLst>
+          </p:cNvPr>
+          <p:cNvSpPr>
+            <a:spLocks noGrp="1"/>
+          </p:cNvSpPr>
+          <p:nvPr>
+            <p:ph type="title"/>
+          </p:nvPr>
+        </p:nvSpPr>
+        <p:spPr/>
+        <p:txBody>
+          <a:bodyPr/>
+          <a:lstStyle/>
+          <a:p>
+            <a:r>
+              <a:rPr lang="en-US" dirty="0"/>
+              <a:t>Caliber Mobile</a:t>
+            </a:r>
+          </a:p>
+        </p:txBody>
+      </p:sp>
+      <p:sp>
+        <p:nvSpPr>
+          <p:cNvPr id="3" name="Text Placeholder 2">
+            <a:extLst>
+              <a:ext uri="{FF2B5EF4-FFF2-40B4-BE49-F238E27FC236}">
+                <a16:creationId xmlns:a16="http://schemas.microsoft.com/office/drawing/2014/main" id="{E4FD7A56-3FFF-4E5F-A159-ADA8E3DC60D3}"/>
+              </a:ext>
+            </a:extLst>
+          </p:cNvPr>
+          <p:cNvSpPr>
+            <a:spLocks noGrp="1"/>
+          </p:cNvSpPr>
+          <p:nvPr>
+            <p:ph type="body" idx="1"/>
+          </p:nvPr>
+        </p:nvSpPr>
+        <p:spPr/>
+        <p:txBody>
+          <a:bodyPr/>
+          <a:lstStyle/>
+          <a:p>
+            <a:pPr marL="50800" indent="0">
+              <a:buNone/>
+            </a:pPr>
+            <a:r>
+              <a:rPr lang="en-US" sz="2400" dirty="0"/>
+              <a:t>Caliber is a performance management suite used to collect and analyze evaluations of </a:t>
+            </a:r>
+            <a:r>
+              <a:rPr lang="en-US" sz="2400" dirty="0" err="1"/>
+              <a:t>Revature</a:t>
+            </a:r>
+            <a:r>
+              <a:rPr lang="en-US" sz="2400" dirty="0"/>
+              <a:t> trainees with the goal of increasing transparency, fostering informed decision making, and creating actionable information. Caliber takes input for any quality checkpoint from the beginning to the end of the associate lifecycle (screening, training, QC, panel, </a:t>
+            </a:r>
+            <a:r>
+              <a:rPr lang="en-US" sz="2400" dirty="0" err="1"/>
+              <a:t>etc</a:t>
+            </a:r>
+            <a:r>
+              <a:rPr lang="en-US" sz="2400" dirty="0"/>
+              <a:t>). The Caliber suite also provides a variety of reports on different levels of granularity using visual dashboards and tabular data. Users can generate individual and batch PDF reports to distribute to clients, trainees, and other stakeholders.</a:t>
+            </a:r>
+          </a:p>
+        </p:txBody>
+      </p:sp>
+      <p:sp>
+        <p:nvSpPr>
+          <p:cNvPr id="4" name="Slide Number Placeholder 3">
+            <a:extLst>
+              <a:ext uri="{FF2B5EF4-FFF2-40B4-BE49-F238E27FC236}">
+                <a16:creationId xmlns:a16="http://schemas.microsoft.com/office/drawing/2014/main" id="{87BE08D5-30F5-480E-9EEA-61418F073402}"/>
+              </a:ext>
+            </a:extLst>
+          </p:cNvPr>
+          <p:cNvSpPr>
+            <a:spLocks noGrp="1"/>
+          </p:cNvSpPr>
+          <p:nvPr>
+            <p:ph type="sldNum" idx="12"/>
+          </p:nvPr>
+        </p:nvSpPr>
+        <p:spPr/>
+        <p:txBody>
+          <a:bodyPr/>
+          <a:lstStyle/>
+          <a:p>
+            <a:pPr marL="0" lvl="0" indent="0" algn="r" rtl="0">
+              <a:spcBef>
+                <a:spcPts val="0"/>
+              </a:spcBef>
+              <a:spcAft>
+                <a:spcPts val="0"/>
+              </a:spcAft>
+              <a:buNone/>
+            </a:pPr>
+            <a:fld id="{00000000-1234-1234-1234-123412341234}" type="slidenum">
+              <a:rPr lang="en-US" smtClean="0"/>
+              <a:t>2</a:t>
+            </a:fld>
+            <a:endParaRPr lang="en-US"/>
+          </a:p>
+        </p:txBody>
+      </p:sp>
+    </p:spTree>
+    <p:extLst>
+      <p:ext uri="{BB962C8B-B14F-4D97-AF65-F5344CB8AC3E}">
+        <p14:creationId xmlns:p14="http://schemas.microsoft.com/office/powerpoint/2010/main" val="512702324"/>
+      </p:ext>
+    </p:extLst>
+  </p:cSld>
+  <p:clrMapOvr>
+    <a:masterClrMapping/>
+  </p:clrMapOvr>
+</p:sld>
+</file>
+
+<file path=ppt/slides/slide4.xml><?xml version="1.0" encoding="utf-8"?>
+<p:sld xmlns:a="http://schemas.openxmlformats.org/drawingml/2006/main" xmlns:r="http://schemas.openxmlformats.org/officeDocument/2006/relationships" xmlns:p="http://schemas.openxmlformats.org/presentationml/2006/main">
+  <p:cSld>
+    <p:spTree>
+      <p:nvGrpSpPr>
+        <p:cNvPr id="1" name=""/>
+        <p:cNvGrpSpPr/>
+        <p:nvPr/>
+      </p:nvGrpSpPr>
+      <p:grpSpPr>
+        <a:xfrm>
+          <a:off x="0" y="0"/>
+          <a:ext cx="0" cy="0"/>
+          <a:chOff x="0" y="0"/>
+          <a:chExt cx="0" cy="0"/>
+        </a:xfrm>
+      </p:grpSpPr>
+      <p:sp>
+        <p:nvSpPr>
+          <p:cNvPr id="2" name="Title 1">
+            <a:extLst>
+              <a:ext uri="{FF2B5EF4-FFF2-40B4-BE49-F238E27FC236}">
+                <a16:creationId xmlns:a16="http://schemas.microsoft.com/office/drawing/2014/main" id="{1DC88FD2-3956-436B-95D1-4445A42134BC}"/>
+              </a:ext>
+            </a:extLst>
+          </p:cNvPr>
+          <p:cNvSpPr>
+            <a:spLocks noGrp="1"/>
+          </p:cNvSpPr>
+          <p:nvPr>
+            <p:ph type="title"/>
+          </p:nvPr>
+        </p:nvSpPr>
+        <p:spPr/>
+        <p:txBody>
+          <a:bodyPr/>
+          <a:lstStyle/>
+          <a:p>
+            <a:r>
+              <a:rPr lang="en-US" sz="3200" dirty="0"/>
+              <a:t>The Team</a:t>
+            </a:r>
+          </a:p>
+        </p:txBody>
+      </p:sp>
+      <p:sp>
+        <p:nvSpPr>
+          <p:cNvPr id="4" name="Slide Number Placeholder 3">
+            <a:extLst>
+              <a:ext uri="{FF2B5EF4-FFF2-40B4-BE49-F238E27FC236}">
+                <a16:creationId xmlns:a16="http://schemas.microsoft.com/office/drawing/2014/main" id="{C1A77D70-A783-472A-936E-989101E5A9D7}"/>
+              </a:ext>
+            </a:extLst>
+          </p:cNvPr>
+          <p:cNvSpPr>
+            <a:spLocks noGrp="1"/>
+          </p:cNvSpPr>
+          <p:nvPr>
+            <p:ph type="sldNum" idx="12"/>
+          </p:nvPr>
+        </p:nvSpPr>
+        <p:spPr/>
+        <p:txBody>
+          <a:bodyPr/>
+          <a:lstStyle/>
+          <a:p>
+            <a:pPr marL="0" lvl="0" indent="0" algn="r" rtl="0">
+              <a:spcBef>
+                <a:spcPts val="0"/>
+              </a:spcBef>
+              <a:spcAft>
+                <a:spcPts val="0"/>
+              </a:spcAft>
+              <a:buNone/>
+            </a:pPr>
+            <a:fld id="{00000000-1234-1234-1234-123412341234}" type="slidenum">
+              <a:rPr lang="en-US" smtClean="0"/>
+              <a:t>3</a:t>
+            </a:fld>
+            <a:endParaRPr lang="en-US"/>
+          </a:p>
+        </p:txBody>
+      </p:sp>
+      <p:sp>
+        <p:nvSpPr>
+          <p:cNvPr id="6" name="Text Placeholder 5">
+            <a:extLst>
+              <a:ext uri="{FF2B5EF4-FFF2-40B4-BE49-F238E27FC236}">
+                <a16:creationId xmlns:a16="http://schemas.microsoft.com/office/drawing/2014/main" id="{237633D1-A1B0-4725-BBB9-08DBC520CECD}"/>
+              </a:ext>
+            </a:extLst>
+          </p:cNvPr>
+          <p:cNvSpPr>
+            <a:spLocks noGrp="1"/>
+          </p:cNvSpPr>
+          <p:nvPr>
+            <p:ph type="body" idx="1"/>
+          </p:nvPr>
+        </p:nvSpPr>
+        <p:spPr>
+          <a:xfrm>
+            <a:off x="6261197" y="2403835"/>
+            <a:ext cx="1970202" cy="4112150"/>
+          </a:xfrm>
+        </p:spPr>
+        <p:txBody>
+          <a:bodyPr/>
+          <a:lstStyle/>
+          <a:p>
+            <a:endParaRPr lang="en-US" dirty="0"/>
+          </a:p>
+        </p:txBody>
+      </p:sp>
+      <p:sp>
+        <p:nvSpPr>
+          <p:cNvPr id="7" name="Text Placeholder 6">
+            <a:extLst>
+              <a:ext uri="{FF2B5EF4-FFF2-40B4-BE49-F238E27FC236}">
+                <a16:creationId xmlns:a16="http://schemas.microsoft.com/office/drawing/2014/main" id="{2A350E49-9699-4EDE-A647-CD99A240BABC}"/>
+              </a:ext>
+            </a:extLst>
+          </p:cNvPr>
+          <p:cNvSpPr>
+            <a:spLocks noGrp="1"/>
+          </p:cNvSpPr>
+          <p:nvPr>
+            <p:ph type="body" idx="2"/>
+          </p:nvPr>
+        </p:nvSpPr>
+        <p:spPr>
+          <a:xfrm>
+            <a:off x="2216213" y="1340617"/>
+            <a:ext cx="4161672" cy="844623"/>
+          </a:xfrm>
+        </p:spPr>
+        <p:txBody>
+          <a:bodyPr/>
+          <a:lstStyle/>
+          <a:p>
+            <a:pPr marL="101600" indent="0">
+              <a:buNone/>
+            </a:pPr>
+            <a:r>
+              <a:rPr lang="en-US" sz="2400" dirty="0"/>
+              <a:t>Scrum Master: Dallin Lemon</a:t>
+            </a:r>
+          </a:p>
+        </p:txBody>
+      </p:sp>
+      <p:sp>
+        <p:nvSpPr>
+          <p:cNvPr id="8" name="Text Placeholder 7">
+            <a:extLst>
+              <a:ext uri="{FF2B5EF4-FFF2-40B4-BE49-F238E27FC236}">
+                <a16:creationId xmlns:a16="http://schemas.microsoft.com/office/drawing/2014/main" id="{ACD33147-66D3-442B-99AA-EF69CA7602BE}"/>
+              </a:ext>
+            </a:extLst>
+          </p:cNvPr>
+          <p:cNvSpPr>
+            <a:spLocks noGrp="1"/>
+          </p:cNvSpPr>
+          <p:nvPr>
+            <p:ph type="body" idx="3"/>
+          </p:nvPr>
+        </p:nvSpPr>
+        <p:spPr>
+          <a:xfrm>
+            <a:off x="3311948" y="2398092"/>
+            <a:ext cx="1970202" cy="4112150"/>
+          </a:xfrm>
+        </p:spPr>
+        <p:txBody>
+          <a:bodyPr/>
+          <a:lstStyle/>
+          <a:p>
+            <a:endParaRPr lang="en-US" dirty="0"/>
+          </a:p>
+        </p:txBody>
+      </p:sp>
+      <p:sp>
+        <p:nvSpPr>
+          <p:cNvPr id="9" name="Text Placeholder 8">
+            <a:extLst>
+              <a:ext uri="{FF2B5EF4-FFF2-40B4-BE49-F238E27FC236}">
+                <a16:creationId xmlns:a16="http://schemas.microsoft.com/office/drawing/2014/main" id="{FBFA8BE5-7B17-47AF-A6D8-23EB876F1871}"/>
+              </a:ext>
+            </a:extLst>
+          </p:cNvPr>
+          <p:cNvSpPr>
+            <a:spLocks noGrp="1"/>
+          </p:cNvSpPr>
+          <p:nvPr>
+            <p:ph type="body" idx="4"/>
+          </p:nvPr>
+        </p:nvSpPr>
+        <p:spPr>
+          <a:xfrm>
+            <a:off x="351116" y="2403834"/>
+            <a:ext cx="2090426" cy="4112151"/>
+          </a:xfrm>
+        </p:spPr>
+        <p:txBody>
+          <a:bodyPr/>
+          <a:lstStyle/>
+          <a:p>
+            <a:endParaRPr lang="en-US" dirty="0"/>
+          </a:p>
+        </p:txBody>
+      </p:sp>
+    </p:spTree>
+    <p:extLst>
+      <p:ext uri="{BB962C8B-B14F-4D97-AF65-F5344CB8AC3E}">
+        <p14:creationId xmlns:p14="http://schemas.microsoft.com/office/powerpoint/2010/main" val="589668187"/>
+      </p:ext>
+    </p:extLst>
+  </p:cSld>
+  <p:clrMapOvr>
+    <a:masterClrMapping/>
+  </p:clrMapOvr>
+</p:sld>
+</file>
+
+<file path=ppt/slides/slide5.xml><?xml version="1.0" encoding="utf-8"?>
+<p:sld xmlns:a="http://schemas.openxmlformats.org/drawingml/2006/main" xmlns:r="http://schemas.openxmlformats.org/officeDocument/2006/relationships" xmlns:p="http://schemas.openxmlformats.org/presentationml/2006/main">
+  <p:cSld>
+    <p:spTree>
+      <p:nvGrpSpPr>
+        <p:cNvPr id="1" name=""/>
+        <p:cNvGrpSpPr/>
+        <p:nvPr/>
+      </p:nvGrpSpPr>
+      <p:grpSpPr>
+        <a:xfrm>
+          <a:off x="0" y="0"/>
+          <a:ext cx="0" cy="0"/>
+          <a:chOff x="0" y="0"/>
+          <a:chExt cx="0" cy="0"/>
+        </a:xfrm>
+      </p:grpSpPr>
+      <p:sp>
+        <p:nvSpPr>
+          <p:cNvPr id="2" name="Title 1">
+            <a:extLst>
+              <a:ext uri="{FF2B5EF4-FFF2-40B4-BE49-F238E27FC236}">
+                <a16:creationId xmlns:a16="http://schemas.microsoft.com/office/drawing/2014/main" id="{36CDCCA5-6CFD-47B0-8132-94F572602142}"/>
+              </a:ext>
+            </a:extLst>
+          </p:cNvPr>
+          <p:cNvSpPr>
+            <a:spLocks noGrp="1"/>
+          </p:cNvSpPr>
+          <p:nvPr>
+            <p:ph type="title"/>
+          </p:nvPr>
+        </p:nvSpPr>
+        <p:spPr/>
+        <p:txBody>
+          <a:bodyPr/>
+          <a:lstStyle/>
+          <a:p>
+            <a:endParaRPr lang="en-US"/>
+          </a:p>
+        </p:txBody>
+      </p:sp>
+      <p:sp>
+        <p:nvSpPr>
+          <p:cNvPr id="3" name="Text Placeholder 2">
+            <a:extLst>
+              <a:ext uri="{FF2B5EF4-FFF2-40B4-BE49-F238E27FC236}">
+                <a16:creationId xmlns:a16="http://schemas.microsoft.com/office/drawing/2014/main" id="{888C0D4C-348C-4A6A-920C-500FA2411754}"/>
+              </a:ext>
+            </a:extLst>
+          </p:cNvPr>
+          <p:cNvSpPr>
+            <a:spLocks noGrp="1"/>
+          </p:cNvSpPr>
+          <p:nvPr>
+            <p:ph type="body" idx="1"/>
+          </p:nvPr>
+        </p:nvSpPr>
+        <p:spPr/>
+        <p:txBody>
+          <a:bodyPr/>
+          <a:lstStyle/>
+          <a:p>
+            <a:endParaRPr lang="en-US"/>
+          </a:p>
+        </p:txBody>
+      </p:sp>
+      <p:sp>
+        <p:nvSpPr>
+          <p:cNvPr id="4" name="Slide Number Placeholder 3">
+            <a:extLst>
+              <a:ext uri="{FF2B5EF4-FFF2-40B4-BE49-F238E27FC236}">
+                <a16:creationId xmlns:a16="http://schemas.microsoft.com/office/drawing/2014/main" id="{68052360-2CF7-4700-AE2A-8773B5FE4C50}"/>
+              </a:ext>
+            </a:extLst>
+          </p:cNvPr>
+          <p:cNvSpPr>
+            <a:spLocks noGrp="1"/>
+          </p:cNvSpPr>
+          <p:nvPr>
+            <p:ph type="sldNum" idx="12"/>
+          </p:nvPr>
+        </p:nvSpPr>
+        <p:spPr/>
+        <p:txBody>
+          <a:bodyPr/>
+          <a:lstStyle/>
+          <a:p>
+            <a:pPr marL="0" lvl="0" indent="0" algn="r" rtl="0">
+              <a:spcBef>
+                <a:spcPts val="0"/>
+              </a:spcBef>
+              <a:spcAft>
+                <a:spcPts val="0"/>
+              </a:spcAft>
+              <a:buNone/>
+            </a:pPr>
+            <a:fld id="{00000000-1234-1234-1234-123412341234}" type="slidenum">
+              <a:rPr lang="en-US" smtClean="0"/>
+              <a:t>4</a:t>
+            </a:fld>
+            <a:endParaRPr lang="en-US"/>
+          </a:p>
+        </p:txBody>
+      </p:sp>
+    </p:spTree>
+    <p:extLst>
+      <p:ext uri="{BB962C8B-B14F-4D97-AF65-F5344CB8AC3E}">
+        <p14:creationId xmlns:p14="http://schemas.microsoft.com/office/powerpoint/2010/main" val="2053695834"/>
+      </p:ext>
+    </p:extLst>
+  </p:cSld>
+  <p:clrMapOvr>
+    <a:masterClrMapping/>
+  </p:clrMapOvr>
+</p:sld>
+</file>
+
+<file path=ppt/slides/slide6.xml><?xml version="1.0" encoding="utf-8"?>
+<p:sld xmlns:a="http://schemas.openxmlformats.org/drawingml/2006/main" xmlns:r="http://schemas.openxmlformats.org/officeDocument/2006/relationships" xmlns:p="http://schemas.openxmlformats.org/presentationml/2006/main">
+  <p:cSld>
+    <p:spTree>
+      <p:nvGrpSpPr>
+        <p:cNvPr id="1" name=""/>
+        <p:cNvGrpSpPr/>
+        <p:nvPr/>
+      </p:nvGrpSpPr>
+      <p:grpSpPr>
+        <a:xfrm>
+          <a:off x="0" y="0"/>
+          <a:ext cx="0" cy="0"/>
+          <a:chOff x="0" y="0"/>
+          <a:chExt cx="0" cy="0"/>
+        </a:xfrm>
+      </p:grpSpPr>
+      <p:sp>
+        <p:nvSpPr>
+          <p:cNvPr id="2" name="Title 1">
+            <a:extLst>
+              <a:ext uri="{FF2B5EF4-FFF2-40B4-BE49-F238E27FC236}">
+                <a16:creationId xmlns:a16="http://schemas.microsoft.com/office/drawing/2014/main" id="{93A024B3-8595-4170-AB98-6C683B32B597}"/>
+              </a:ext>
+            </a:extLst>
+          </p:cNvPr>
+          <p:cNvSpPr>
+            <a:spLocks noGrp="1"/>
+          </p:cNvSpPr>
+          <p:nvPr>
+            <p:ph type="title"/>
+          </p:nvPr>
+        </p:nvSpPr>
+        <p:spPr/>
+        <p:txBody>
+          <a:bodyPr/>
+          <a:lstStyle/>
+          <a:p>
+            <a:endParaRPr lang="en-US"/>
+          </a:p>
+        </p:txBody>
+      </p:sp>
+      <p:sp>
+        <p:nvSpPr>
+          <p:cNvPr id="3" name="Text Placeholder 2">
+            <a:extLst>
+              <a:ext uri="{FF2B5EF4-FFF2-40B4-BE49-F238E27FC236}">
+                <a16:creationId xmlns:a16="http://schemas.microsoft.com/office/drawing/2014/main" id="{70D8BE60-7EE2-4614-B646-583F9BF3328D}"/>
+              </a:ext>
+            </a:extLst>
+          </p:cNvPr>
+          <p:cNvSpPr>
+            <a:spLocks noGrp="1"/>
+          </p:cNvSpPr>
+          <p:nvPr>
+            <p:ph type="body" idx="1"/>
+          </p:nvPr>
+        </p:nvSpPr>
+        <p:spPr/>
+        <p:txBody>
+          <a:bodyPr/>
+          <a:lstStyle/>
+          <a:p>
+            <a:endParaRPr lang="en-US"/>
+          </a:p>
+        </p:txBody>
+      </p:sp>
+      <p:sp>
+        <p:nvSpPr>
+          <p:cNvPr id="4" name="Slide Number Placeholder 3">
+            <a:extLst>
+              <a:ext uri="{FF2B5EF4-FFF2-40B4-BE49-F238E27FC236}">
+                <a16:creationId xmlns:a16="http://schemas.microsoft.com/office/drawing/2014/main" id="{8F70B9EB-450B-4A59-9E39-DA5721AB52DC}"/>
+              </a:ext>
+            </a:extLst>
+          </p:cNvPr>
+          <p:cNvSpPr>
+            <a:spLocks noGrp="1"/>
+          </p:cNvSpPr>
+          <p:nvPr>
+            <p:ph type="sldNum" idx="12"/>
+          </p:nvPr>
+        </p:nvSpPr>
+        <p:spPr/>
+        <p:txBody>
+          <a:bodyPr/>
+          <a:lstStyle/>
+          <a:p>
+            <a:pPr marL="0" lvl="0" indent="0" algn="r" rtl="0">
+              <a:spcBef>
+                <a:spcPts val="0"/>
+              </a:spcBef>
+              <a:spcAft>
+                <a:spcPts val="0"/>
+              </a:spcAft>
+              <a:buNone/>
+            </a:pPr>
+            <a:fld id="{00000000-1234-1234-1234-123412341234}" type="slidenum">
+              <a:rPr lang="en-US" smtClean="0"/>
+              <a:t>5</a:t>
+            </a:fld>
+            <a:endParaRPr lang="en-US"/>
+          </a:p>
+        </p:txBody>
+      </p:sp>
+    </p:spTree>
+    <p:extLst>
+      <p:ext uri="{BB962C8B-B14F-4D97-AF65-F5344CB8AC3E}">
+        <p14:creationId xmlns:p14="http://schemas.microsoft.com/office/powerpoint/2010/main" val="4139737888"/>
+      </p:ext>
+    </p:extLst>
+  </p:cSld>
+  <p:clrMapOvr>
+    <a:masterClrMapping/>
+  </p:clrMapOvr>
+</p:sld>
+</file>
+
+<file path=ppt/slides/slide7.xml><?xml version="1.0" encoding="utf-8"?>
+<p:sld xmlns:a="http://schemas.openxmlformats.org/drawingml/2006/main" xmlns:r="http://schemas.openxmlformats.org/officeDocument/2006/relationships" xmlns:p="http://schemas.openxmlformats.org/presentationml/2006/main">
+  <p:cSld>
+    <p:spTree>
+      <p:nvGrpSpPr>
+        <p:cNvPr id="1" name=""/>
+        <p:cNvGrpSpPr/>
+        <p:nvPr/>
+      </p:nvGrpSpPr>
+      <p:grpSpPr>
+        <a:xfrm>
+          <a:off x="0" y="0"/>
+          <a:ext cx="0" cy="0"/>
+          <a:chOff x="0" y="0"/>
+          <a:chExt cx="0" cy="0"/>
+        </a:xfrm>
+      </p:grpSpPr>
+      <p:sp>
+        <p:nvSpPr>
+          <p:cNvPr id="2" name="Title 1">
+            <a:extLst>
+              <a:ext uri="{FF2B5EF4-FFF2-40B4-BE49-F238E27FC236}">
+                <a16:creationId xmlns:a16="http://schemas.microsoft.com/office/drawing/2014/main" id="{90411D60-58D4-4CB9-ABC8-BA736FD080E7}"/>
+              </a:ext>
+            </a:extLst>
+          </p:cNvPr>
+          <p:cNvSpPr>
+            <a:spLocks noGrp="1"/>
+          </p:cNvSpPr>
+          <p:nvPr>
+            <p:ph type="title"/>
+          </p:nvPr>
+        </p:nvSpPr>
+        <p:spPr/>
+        <p:txBody>
+          <a:bodyPr/>
+          <a:lstStyle/>
+          <a:p>
+            <a:endParaRPr lang="en-US"/>
+          </a:p>
+        </p:txBody>
+      </p:sp>
+      <p:sp>
+        <p:nvSpPr>
+          <p:cNvPr id="3" name="Text Placeholder 2">
+            <a:extLst>
+              <a:ext uri="{FF2B5EF4-FFF2-40B4-BE49-F238E27FC236}">
+                <a16:creationId xmlns:a16="http://schemas.microsoft.com/office/drawing/2014/main" id="{8FFBEDCB-06EC-44C7-B58E-15AEA1A4A723}"/>
+              </a:ext>
+            </a:extLst>
+          </p:cNvPr>
+          <p:cNvSpPr>
+            <a:spLocks noGrp="1"/>
+          </p:cNvSpPr>
+          <p:nvPr>
+            <p:ph type="body" idx="1"/>
+          </p:nvPr>
+        </p:nvSpPr>
+        <p:spPr/>
+        <p:txBody>
+          <a:bodyPr/>
+          <a:lstStyle/>
+          <a:p>
+            <a:endParaRPr lang="en-US"/>
+          </a:p>
+        </p:txBody>
+      </p:sp>
+      <p:sp>
+        <p:nvSpPr>
+          <p:cNvPr id="4" name="Slide Number Placeholder 3">
+            <a:extLst>
+              <a:ext uri="{FF2B5EF4-FFF2-40B4-BE49-F238E27FC236}">
+                <a16:creationId xmlns:a16="http://schemas.microsoft.com/office/drawing/2014/main" id="{6DC67ECD-FBA2-477B-9C8A-18752FBB2820}"/>
+              </a:ext>
+            </a:extLst>
+          </p:cNvPr>
+          <p:cNvSpPr>
+            <a:spLocks noGrp="1"/>
+          </p:cNvSpPr>
+          <p:nvPr>
+            <p:ph type="sldNum" idx="12"/>
+          </p:nvPr>
+        </p:nvSpPr>
+        <p:spPr/>
+        <p:txBody>
+          <a:bodyPr/>
+          <a:lstStyle/>
+          <a:p>
+            <a:pPr marL="0" lvl="0" indent="0" algn="r" rtl="0">
+              <a:spcBef>
+                <a:spcPts val="0"/>
+              </a:spcBef>
+              <a:spcAft>
+                <a:spcPts val="0"/>
+              </a:spcAft>
+              <a:buNone/>
+            </a:pPr>
+            <a:fld id="{00000000-1234-1234-1234-123412341234}" type="slidenum">
+              <a:rPr lang="en-US" smtClean="0"/>
+              <a:t>6</a:t>
+            </a:fld>
+            <a:endParaRPr lang="en-US"/>
+          </a:p>
+        </p:txBody>
+      </p:sp>
+    </p:spTree>
+    <p:extLst>
+      <p:ext uri="{BB962C8B-B14F-4D97-AF65-F5344CB8AC3E}">
+        <p14:creationId xmlns:p14="http://schemas.microsoft.com/office/powerpoint/2010/main" val="3930595375"/>
+      </p:ext>
+    </p:extLst>
+  </p:cSld>
+  <p:clrMapOvr>
+    <a:masterClrMapping/>
+  </p:clrMapOvr>
+</p:sld>
+</file>
+
+<file path=ppt/slides/slide8.xml><?xml version="1.0" encoding="utf-8"?>
+<p:sld xmlns:a="http://schemas.openxmlformats.org/drawingml/2006/main" xmlns:r="http://schemas.openxmlformats.org/officeDocument/2006/relationships" xmlns:p="http://schemas.openxmlformats.org/presentationml/2006/main">
+  <p:cSld>
+    <p:spTree>
+      <p:nvGrpSpPr>
+        <p:cNvPr id="1" name=""/>
+        <p:cNvGrpSpPr/>
+        <p:nvPr/>
+      </p:nvGrpSpPr>
+      <p:grpSpPr>
+        <a:xfrm>
+          <a:off x="0" y="0"/>
+          <a:ext cx="0" cy="0"/>
+          <a:chOff x="0" y="0"/>
+          <a:chExt cx="0" cy="0"/>
+        </a:xfrm>
+      </p:grpSpPr>
+      <p:sp>
+        <p:nvSpPr>
+          <p:cNvPr id="2" name="Title 1">
+            <a:extLst>
+              <a:ext uri="{FF2B5EF4-FFF2-40B4-BE49-F238E27FC236}">
+                <a16:creationId xmlns:a16="http://schemas.microsoft.com/office/drawing/2014/main" id="{6F1269E2-C031-42DC-AAA5-1C94C9E841CA}"/>
+              </a:ext>
+            </a:extLst>
+          </p:cNvPr>
+          <p:cNvSpPr>
+            <a:spLocks noGrp="1"/>
+          </p:cNvSpPr>
+          <p:nvPr>
+            <p:ph type="title"/>
+          </p:nvPr>
+        </p:nvSpPr>
+        <p:spPr/>
+        <p:txBody>
+          <a:bodyPr/>
+          <a:lstStyle/>
+          <a:p>
+            <a:endParaRPr lang="en-US"/>
+          </a:p>
+        </p:txBody>
+      </p:sp>
+      <p:sp>
+        <p:nvSpPr>
+          <p:cNvPr id="3" name="Text Placeholder 2">
+            <a:extLst>
+              <a:ext uri="{FF2B5EF4-FFF2-40B4-BE49-F238E27FC236}">
+                <a16:creationId xmlns:a16="http://schemas.microsoft.com/office/drawing/2014/main" id="{83BDFA52-61D5-47D0-84D8-5559AAA6AC93}"/>
+              </a:ext>
+            </a:extLst>
+          </p:cNvPr>
+          <p:cNvSpPr>
+            <a:spLocks noGrp="1"/>
+          </p:cNvSpPr>
+          <p:nvPr>
+            <p:ph type="body" idx="1"/>
+          </p:nvPr>
+        </p:nvSpPr>
+        <p:spPr/>
+        <p:txBody>
+          <a:bodyPr/>
+          <a:lstStyle/>
+          <a:p>
+            <a:endParaRPr lang="en-US"/>
+          </a:p>
+        </p:txBody>
+      </p:sp>
+      <p:sp>
+        <p:nvSpPr>
+          <p:cNvPr id="4" name="Slide Number Placeholder 3">
+            <a:extLst>
+              <a:ext uri="{FF2B5EF4-FFF2-40B4-BE49-F238E27FC236}">
+                <a16:creationId xmlns:a16="http://schemas.microsoft.com/office/drawing/2014/main" id="{65DBA46C-6A38-4018-97C4-6D5C683FBF05}"/>
+              </a:ext>
+            </a:extLst>
+          </p:cNvPr>
+          <p:cNvSpPr>
+            <a:spLocks noGrp="1"/>
+          </p:cNvSpPr>
+          <p:nvPr>
+            <p:ph type="sldNum" idx="12"/>
+          </p:nvPr>
+        </p:nvSpPr>
+        <p:spPr/>
+        <p:txBody>
+          <a:bodyPr/>
+          <a:lstStyle/>
+          <a:p>
+            <a:pPr marL="0" lvl="0" indent="0" algn="r" rtl="0">
+              <a:spcBef>
+                <a:spcPts val="0"/>
+              </a:spcBef>
+              <a:spcAft>
+                <a:spcPts val="0"/>
+              </a:spcAft>
+              <a:buNone/>
+            </a:pPr>
+            <a:fld id="{00000000-1234-1234-1234-123412341234}" type="slidenum">
+              <a:rPr lang="en-US" smtClean="0"/>
+              <a:t>7</a:t>
+            </a:fld>
+            <a:endParaRPr lang="en-US"/>
+          </a:p>
+        </p:txBody>
+      </p:sp>
+    </p:spTree>
+    <p:extLst>
+      <p:ext uri="{BB962C8B-B14F-4D97-AF65-F5344CB8AC3E}">
+        <p14:creationId xmlns:p14="http://schemas.microsoft.com/office/powerpoint/2010/main" val="1394678219"/>
+      </p:ext>
+    </p:extLst>
+  </p:cSld>
+  <p:clrMapOvr>
+    <a:masterClrMapping/>
+  </p:clrMapOvr>
+</p:sld>
+</file>
+
+<file path=ppt/slides/slide9.xml><?xml version="1.0" encoding="utf-8"?>
+<p:sld xmlns:a="http://schemas.openxmlformats.org/drawingml/2006/main" xmlns:r="http://schemas.openxmlformats.org/officeDocument/2006/relationships" xmlns:p="http://schemas.openxmlformats.org/presentationml/2006/main">
+  <p:cSld>
+    <p:spTree>
+      <p:nvGrpSpPr>
+        <p:cNvPr id="1" name=""/>
+        <p:cNvGrpSpPr/>
+        <p:nvPr/>
+      </p:nvGrpSpPr>
+      <p:grpSpPr>
+        <a:xfrm>
+          <a:off x="0" y="0"/>
+          <a:ext cx="0" cy="0"/>
+          <a:chOff x="0" y="0"/>
+          <a:chExt cx="0" cy="0"/>
+        </a:xfrm>
+      </p:grpSpPr>
+      <p:sp>
+        <p:nvSpPr>
+          <p:cNvPr id="2" name="Title 1">
+            <a:extLst>
+              <a:ext uri="{FF2B5EF4-FFF2-40B4-BE49-F238E27FC236}">
+                <a16:creationId xmlns:a16="http://schemas.microsoft.com/office/drawing/2014/main" id="{9FB7B306-B0C1-4A1A-B5D1-7239F1C97C74}"/>
+              </a:ext>
+            </a:extLst>
+          </p:cNvPr>
+          <p:cNvSpPr>
+            <a:spLocks noGrp="1"/>
+          </p:cNvSpPr>
+          <p:nvPr>
+            <p:ph type="title"/>
+          </p:nvPr>
+        </p:nvSpPr>
+        <p:spPr/>
+        <p:txBody>
+          <a:bodyPr/>
+          <a:lstStyle/>
+          <a:p>
+            <a:endParaRPr lang="en-US"/>
+          </a:p>
+        </p:txBody>
+      </p:sp>
+      <p:sp>
+        <p:nvSpPr>
+          <p:cNvPr id="3" name="Text Placeholder 2">
+            <a:extLst>
+              <a:ext uri="{FF2B5EF4-FFF2-40B4-BE49-F238E27FC236}">
+                <a16:creationId xmlns:a16="http://schemas.microsoft.com/office/drawing/2014/main" id="{45374DBF-3A1C-4EAF-8AF7-D7A70C4930C0}"/>
+              </a:ext>
+            </a:extLst>
+          </p:cNvPr>
+          <p:cNvSpPr>
+            <a:spLocks noGrp="1"/>
+          </p:cNvSpPr>
+          <p:nvPr>
+            <p:ph type="body" idx="1"/>
+          </p:nvPr>
+        </p:nvSpPr>
+        <p:spPr/>
+        <p:txBody>
+          <a:bodyPr/>
+          <a:lstStyle/>
+          <a:p>
+            <a:endParaRPr lang="en-US"/>
+          </a:p>
+        </p:txBody>
+      </p:sp>
+      <p:sp>
+        <p:nvSpPr>
+          <p:cNvPr id="4" name="Slide Number Placeholder 3">
+            <a:extLst>
+              <a:ext uri="{FF2B5EF4-FFF2-40B4-BE49-F238E27FC236}">
+                <a16:creationId xmlns:a16="http://schemas.microsoft.com/office/drawing/2014/main" id="{D4763A16-DE1A-4DB4-8FCC-3D8FB62C837E}"/>
+              </a:ext>
+            </a:extLst>
+          </p:cNvPr>
+          <p:cNvSpPr>
+            <a:spLocks noGrp="1"/>
+          </p:cNvSpPr>
+          <p:nvPr>
+            <p:ph type="sldNum" idx="12"/>
+          </p:nvPr>
+        </p:nvSpPr>
+        <p:spPr/>
+        <p:txBody>
+          <a:bodyPr/>
+          <a:lstStyle/>
+          <a:p>
+            <a:pPr marL="0" lvl="0" indent="0" algn="r" rtl="0">
+              <a:spcBef>
+                <a:spcPts val="0"/>
+              </a:spcBef>
+              <a:spcAft>
+                <a:spcPts val="0"/>
+              </a:spcAft>
+              <a:buNone/>
+            </a:pPr>
+            <a:fld id="{00000000-1234-1234-1234-123412341234}" type="slidenum">
+              <a:rPr lang="en-US" smtClean="0"/>
+              <a:t>8</a:t>
+            </a:fld>
+            <a:endParaRPr lang="en-US"/>
+          </a:p>
+        </p:txBody>
+      </p:sp>
+    </p:spTree>
+    <p:extLst>
+      <p:ext uri="{BB962C8B-B14F-4D97-AF65-F5344CB8AC3E}">
+        <p14:creationId xmlns:p14="http://schemas.microsoft.com/office/powerpoint/2010/main" val="1476889589"/>
+      </p:ext>
+    </p:extLst>
   </p:cSld>
   <p:clrMapOvr>
     <a:masterClrMapping/>

</xml_diff>

<commit_message>
updated presentation, added tasks file
</commit_message>
<xml_diff>
--- a/Sprint Documentation/Caliber Mobile Presentation.pptx
+++ b/Sprint Documentation/Caliber Mobile Presentation.pptx
@@ -28217,7 +28217,7 @@
                 <a:cs typeface="Arial"/>
                 <a:sym typeface="Arial"/>
               </a:rPr>
-              <a:t>Caliber Mobile- Synopsis</a:t>
+              <a:t>The Team</a:t>
             </a:r>
           </a:p>
           <a:p>
@@ -28237,7 +28237,7 @@
             </a:pPr>
             <a:r>
               <a:rPr lang="en-US" dirty="0"/>
-              <a:t>The Team</a:t>
+              <a:t>Caliber Mobile- Synopsis</a:t>
             </a:r>
           </a:p>
           <a:p>
@@ -28414,7 +28414,7 @@
                 <a:cs typeface="Arial"/>
                 <a:sym typeface="Arial"/>
               </a:rPr>
-              <a:t>Challenges</a:t>
+              <a:t>Challenges/Recommendations for Future Iterations</a:t>
             </a:r>
           </a:p>
           <a:p>

</xml_diff>